<commit_message>
update - more needed
</commit_message>
<xml_diff>
--- a/topic02-first-steps/unit-02a-lectures/talk-1/a-introduction-to-haskell.pptx
+++ b/topic02-first-steps/unit-02a-lectures/talk-1/a-introduction-to-haskell.pptx
@@ -5,10 +5,10 @@
     <p:sldMasterId id="2147484418" r:id="rId1"/>
   </p:sldMasterIdLst>
   <p:notesMasterIdLst>
-    <p:notesMasterId r:id="rId15"/>
+    <p:notesMasterId r:id="rId16"/>
   </p:notesMasterIdLst>
   <p:handoutMasterIdLst>
-    <p:handoutMasterId r:id="rId16"/>
+    <p:handoutMasterId r:id="rId17"/>
   </p:handoutMasterIdLst>
   <p:sldIdLst>
     <p:sldId id="287" r:id="rId2"/>
@@ -24,6 +24,7 @@
     <p:sldId id="294" r:id="rId12"/>
     <p:sldId id="298" r:id="rId13"/>
     <p:sldId id="295" r:id="rId14"/>
+    <p:sldId id="317" r:id="rId15"/>
   </p:sldIdLst>
   <p:sldSz cx="12192000" cy="6858000"/>
   <p:notesSz cx="7089775" cy="10218738"/>
@@ -12414,6 +12415,142 @@
     <p:extLst>
       <p:ext uri="{BB962C8B-B14F-4D97-AF65-F5344CB8AC3E}">
         <p14:creationId xmlns:p14="http://schemas.microsoft.com/office/powerpoint/2010/main" val="2041776180"/>
+      </p:ext>
+    </p:extLst>
+  </p:cSld>
+  <p:clrMapOvr>
+    <a:masterClrMapping/>
+  </p:clrMapOvr>
+</p:sld>
+</file>
+
+<file path=ppt/slides/slide14.xml><?xml version="1.0" encoding="utf-8"?>
+<p:sld xmlns:a="http://schemas.openxmlformats.org/drawingml/2006/main" xmlns:r="http://schemas.openxmlformats.org/officeDocument/2006/relationships" xmlns:p="http://schemas.openxmlformats.org/presentationml/2006/main">
+  <p:cSld>
+    <p:spTree>
+      <p:nvGrpSpPr>
+        <p:cNvPr id="1" name=""/>
+        <p:cNvGrpSpPr/>
+        <p:nvPr/>
+      </p:nvGrpSpPr>
+      <p:grpSpPr>
+        <a:xfrm>
+          <a:off x="0" y="0"/>
+          <a:ext cx="0" cy="0"/>
+          <a:chOff x="0" y="0"/>
+          <a:chExt cx="0" cy="0"/>
+        </a:xfrm>
+      </p:grpSpPr>
+      <p:sp>
+        <p:nvSpPr>
+          <p:cNvPr id="3" name="Slide Number Placeholder 2">
+            <a:extLst>
+              <a:ext uri="{FF2B5EF4-FFF2-40B4-BE49-F238E27FC236}">
+                <a16:creationId xmlns:a16="http://schemas.microsoft.com/office/drawing/2014/main" id="{44577FC6-C59C-2669-4EF6-7A0FEDBE82A8}"/>
+              </a:ext>
+            </a:extLst>
+          </p:cNvPr>
+          <p:cNvSpPr>
+            <a:spLocks noGrp="1"/>
+          </p:cNvSpPr>
+          <p:nvPr>
+            <p:ph type="sldNum" sz="quarter" idx="12"/>
+          </p:nvPr>
+        </p:nvSpPr>
+        <p:spPr/>
+        <p:txBody>
+          <a:bodyPr/>
+          <a:lstStyle/>
+          <a:p>
+            <a:pPr>
+              <a:defRPr/>
+            </a:pPr>
+            <a:fld id="{052FD39C-9ADB-C245-9503-846EF8BEFA4C}" type="slidenum">
+              <a:rPr lang="en-US" smtClean="0"/>
+              <a:pPr>
+                <a:defRPr/>
+              </a:pPr>
+              <a:t>13</a:t>
+            </a:fld>
+            <a:endParaRPr lang="en-US"/>
+          </a:p>
+        </p:txBody>
+      </p:sp>
+      <p:pic>
+        <p:nvPicPr>
+          <p:cNvPr id="4" name="Picture 3" descr="A green question mark in a circle&#10;&#10;AI-generated content may be incorrect.">
+            <a:extLst>
+              <a:ext uri="{FF2B5EF4-FFF2-40B4-BE49-F238E27FC236}">
+                <a16:creationId xmlns:a16="http://schemas.microsoft.com/office/drawing/2014/main" id="{0F2E1EFF-4C98-7A67-9191-8B8D24E858A9}"/>
+              </a:ext>
+            </a:extLst>
+          </p:cNvPr>
+          <p:cNvPicPr>
+            <a:picLocks noChangeAspect="1"/>
+          </p:cNvPicPr>
+          <p:nvPr/>
+        </p:nvPicPr>
+        <p:blipFill>
+          <a:blip r:embed="rId2">
+            <a:extLst>
+              <a:ext uri="{28A0092B-C50C-407E-A947-70E740481C1C}">
+                <a14:useLocalDpi xmlns:a14="http://schemas.microsoft.com/office/drawing/2010/main" val="0"/>
+              </a:ext>
+            </a:extLst>
+          </a:blip>
+          <a:stretch>
+            <a:fillRect/>
+          </a:stretch>
+        </p:blipFill>
+        <p:spPr>
+          <a:xfrm>
+            <a:off x="3467100" y="178406"/>
+            <a:ext cx="5257800" cy="5257800"/>
+          </a:xfrm>
+          <a:prstGeom prst="rect">
+            <a:avLst/>
+          </a:prstGeom>
+        </p:spPr>
+      </p:pic>
+      <p:sp>
+        <p:nvSpPr>
+          <p:cNvPr id="5" name="TextBox 4">
+            <a:extLst>
+              <a:ext uri="{FF2B5EF4-FFF2-40B4-BE49-F238E27FC236}">
+                <a16:creationId xmlns:a16="http://schemas.microsoft.com/office/drawing/2014/main" id="{A0DBB535-4846-79B5-29B5-3BAB2EE500A1}"/>
+              </a:ext>
+            </a:extLst>
+          </p:cNvPr>
+          <p:cNvSpPr txBox="1"/>
+          <p:nvPr/>
+        </p:nvSpPr>
+        <p:spPr>
+          <a:xfrm>
+            <a:off x="4105551" y="5602461"/>
+            <a:ext cx="3980898" cy="707886"/>
+          </a:xfrm>
+          <a:prstGeom prst="rect">
+            <a:avLst/>
+          </a:prstGeom>
+          <a:noFill/>
+        </p:spPr>
+        <p:txBody>
+          <a:bodyPr wrap="none" rtlCol="0">
+            <a:spAutoFit/>
+          </a:bodyPr>
+          <a:lstStyle/>
+          <a:p>
+            <a:r>
+              <a:rPr lang="en-US" sz="4000" dirty="0"/>
+              <a:t>Any Questions ? </a:t>
+            </a:r>
+          </a:p>
+        </p:txBody>
+      </p:sp>
+    </p:spTree>
+    <p:extLst>
+      <p:ext uri="{BB962C8B-B14F-4D97-AF65-F5344CB8AC3E}">
+        <p14:creationId xmlns:p14="http://schemas.microsoft.com/office/powerpoint/2010/main" val="824035140"/>
       </p:ext>
     </p:extLst>
   </p:cSld>

</xml_diff>

<commit_message>
update title on slides from chapter to slides
</commit_message>
<xml_diff>
--- a/topic02-first-steps/unit-02a-lectures/talk-1/a-introduction-to-haskell.pptx
+++ b/topic02-first-steps/unit-02a-lectures/talk-1/a-introduction-to-haskell.pptx
@@ -531,14 +531,14 @@
           </a:ln>
           <a:extLst>
             <a:ext uri="{909E8E84-426E-40dd-AFC4-6F175D3DCCD1}">
-              <a14:hiddenFill xmlns="" xmlns:a14="http://schemas.microsoft.com/office/drawing/2010/main">
+              <a14:hiddenFill xmlns:a14="http://schemas.microsoft.com/office/drawing/2010/main" xmlns="">
                 <a:solidFill>
                   <a:srgbClr val="FFFFFF"/>
                 </a:solidFill>
               </a14:hiddenFill>
             </a:ext>
             <a:ext uri="{FAA26D3D-D897-4be2-8F04-BA451C77F1D7}">
-              <ma14:placeholderFlag xmlns="" xmlns:ma14="http://schemas.microsoft.com/office/mac/drawingml/2011/main" val="1"/>
+              <ma14:placeholderFlag xmlns:ma14="http://schemas.microsoft.com/office/mac/drawingml/2011/main" xmlns="" val="1"/>
             </a:ext>
           </a:extLst>
         </p:spPr>
@@ -1116,7 +1116,7 @@
             <a:fld id="{08B9EBBA-996F-894A-B54A-D6246ED52CEA}" type="datetimeFigureOut">
               <a:rPr lang="en-US" smtClean="0"/>
               <a:pPr/>
-              <a:t>1/21/26</a:t>
+              <a:t>1/27/26</a:t>
             </a:fld>
             <a:endParaRPr lang="en-US" dirty="0"/>
           </a:p>
@@ -1538,7 +1538,7 @@
             <a:fld id="{09B482E8-6E0E-1B4F-B1FD-C69DB9E858D9}" type="datetimeFigureOut">
               <a:rPr lang="en-US" smtClean="0"/>
               <a:pPr/>
-              <a:t>1/21/26</a:t>
+              <a:t>1/27/26</a:t>
             </a:fld>
             <a:endParaRPr lang="en-US" dirty="0"/>
           </a:p>
@@ -1882,7 +1882,7 @@
             <a:fld id="{09B482E8-6E0E-1B4F-B1FD-C69DB9E858D9}" type="datetimeFigureOut">
               <a:rPr lang="en-US" smtClean="0"/>
               <a:pPr/>
-              <a:t>1/21/26</a:t>
+              <a:t>1/27/26</a:t>
             </a:fld>
             <a:endParaRPr lang="en-US" dirty="0"/>
           </a:p>
@@ -2295,7 +2295,7 @@
             <a:fld id="{09B482E8-6E0E-1B4F-B1FD-C69DB9E858D9}" type="datetimeFigureOut">
               <a:rPr lang="en-US" smtClean="0"/>
               <a:pPr/>
-              <a:t>1/21/26</a:t>
+              <a:t>1/27/26</a:t>
             </a:fld>
             <a:endParaRPr lang="en-US" dirty="0"/>
           </a:p>
@@ -2871,7 +2871,7 @@
             <a:fld id="{09B482E8-6E0E-1B4F-B1FD-C69DB9E858D9}" type="datetimeFigureOut">
               <a:rPr lang="en-US" smtClean="0"/>
               <a:pPr/>
-              <a:t>1/21/26</a:t>
+              <a:t>1/27/26</a:t>
             </a:fld>
             <a:endParaRPr lang="en-US" dirty="0"/>
           </a:p>
@@ -3560,7 +3560,7 @@
             <a:fld id="{09B482E8-6E0E-1B4F-B1FD-C69DB9E858D9}" type="datetimeFigureOut">
               <a:rPr lang="en-US" smtClean="0"/>
               <a:pPr/>
-              <a:t>1/21/26</a:t>
+              <a:t>1/27/26</a:t>
             </a:fld>
             <a:endParaRPr lang="en-US" dirty="0"/>
           </a:p>
@@ -4481,7 +4481,7 @@
             <a:fld id="{09B482E8-6E0E-1B4F-B1FD-C69DB9E858D9}" type="datetimeFigureOut">
               <a:rPr lang="en-US" smtClean="0"/>
               <a:pPr/>
-              <a:t>1/21/26</a:t>
+              <a:t>1/27/26</a:t>
             </a:fld>
             <a:endParaRPr lang="en-US" dirty="0"/>
           </a:p>
@@ -4802,7 +4802,7 @@
             <a:fld id="{09B482E8-6E0E-1B4F-B1FD-C69DB9E858D9}" type="datetimeFigureOut">
               <a:rPr lang="en-US" smtClean="0"/>
               <a:pPr/>
-              <a:t>1/21/26</a:t>
+              <a:t>1/27/26</a:t>
             </a:fld>
             <a:endParaRPr lang="en-US" dirty="0"/>
           </a:p>
@@ -5074,7 +5074,7 @@
             <a:fld id="{09B482E8-6E0E-1B4F-B1FD-C69DB9E858D9}" type="datetimeFigureOut">
               <a:rPr lang="en-US" smtClean="0"/>
               <a:pPr/>
-              <a:t>1/21/26</a:t>
+              <a:t>1/27/26</a:t>
             </a:fld>
             <a:endParaRPr lang="en-US" dirty="0"/>
           </a:p>
@@ -5273,6 +5273,13 @@
             <a:schemeClr val="lt1"/>
           </a:fontRef>
         </p:style>
+        <p:txBody>
+          <a:bodyPr/>
+          <a:lstStyle/>
+          <a:p>
+            <a:endParaRPr lang="en-US"/>
+          </a:p>
+        </p:txBody>
       </p:sp>
       <p:sp>
         <p:nvSpPr>
@@ -5311,6 +5318,13 @@
             <a:schemeClr val="lt1"/>
           </a:fontRef>
         </p:style>
+        <p:txBody>
+          <a:bodyPr/>
+          <a:lstStyle/>
+          <a:p>
+            <a:endParaRPr lang="en-US"/>
+          </a:p>
+        </p:txBody>
       </p:sp>
       <p:sp>
         <p:nvSpPr>
@@ -5405,7 +5419,7 @@
             <a:fld id="{09B482E8-6E0E-1B4F-B1FD-C69DB9E858D9}" type="datetimeFigureOut">
               <a:rPr lang="en-US" smtClean="0"/>
               <a:pPr/>
-              <a:t>1/21/26</a:t>
+              <a:t>1/27/26</a:t>
             </a:fld>
             <a:endParaRPr lang="en-US" dirty="0"/>
           </a:p>
@@ -5802,7 +5816,7 @@
             <a:fld id="{8DFA1846-DA80-1C48-A609-854EA85C59AD}" type="datetimeFigureOut">
               <a:rPr lang="en-US" smtClean="0"/>
               <a:pPr/>
-              <a:t>1/21/26</a:t>
+              <a:t>1/27/26</a:t>
             </a:fld>
             <a:endParaRPr lang="en-US" dirty="0"/>
           </a:p>
@@ -6186,7 +6200,7 @@
             <a:fld id="{09B482E8-6E0E-1B4F-B1FD-C69DB9E858D9}" type="datetimeFigureOut">
               <a:rPr lang="en-US" smtClean="0"/>
               <a:pPr/>
-              <a:t>1/21/26</a:t>
+              <a:t>1/27/26</a:t>
             </a:fld>
             <a:endParaRPr lang="en-US" dirty="0"/>
           </a:p>
@@ -6700,7 +6714,7 @@
             <a:fld id="{09B482E8-6E0E-1B4F-B1FD-C69DB9E858D9}" type="datetimeFigureOut">
               <a:rPr lang="en-US" smtClean="0"/>
               <a:pPr/>
-              <a:t>1/21/26</a:t>
+              <a:t>1/27/26</a:t>
             </a:fld>
             <a:endParaRPr lang="en-US" dirty="0"/>
           </a:p>
@@ -6885,6 +6899,13 @@
             <a:schemeClr val="lt1"/>
           </a:fontRef>
         </p:style>
+        <p:txBody>
+          <a:bodyPr/>
+          <a:lstStyle/>
+          <a:p>
+            <a:endParaRPr lang="en-US"/>
+          </a:p>
+        </p:txBody>
       </p:sp>
       <p:sp>
         <p:nvSpPr>
@@ -6923,6 +6944,13 @@
             <a:schemeClr val="lt1"/>
           </a:fontRef>
         </p:style>
+        <p:txBody>
+          <a:bodyPr/>
+          <a:lstStyle/>
+          <a:p>
+            <a:endParaRPr lang="en-US"/>
+          </a:p>
+        </p:txBody>
       </p:sp>
       <p:sp>
         <p:nvSpPr>
@@ -6965,7 +6993,7 @@
             <a:fld id="{F13A34C8-038E-2045-AF43-DF7DBB8E0E9E}" type="datetimeFigureOut">
               <a:rPr lang="en-US" smtClean="0"/>
               <a:pPr/>
-              <a:t>1/21/26</a:t>
+              <a:t>1/27/26</a:t>
             </a:fld>
             <a:endParaRPr lang="en-US" dirty="0"/>
           </a:p>
@@ -7142,7 +7170,7 @@
             <a:fld id="{8818C68F-D26B-8F47-958C-23B49CF8A634}" type="datetimeFigureOut">
               <a:rPr lang="en-US" smtClean="0"/>
               <a:pPr/>
-              <a:t>1/21/26</a:t>
+              <a:t>1/27/26</a:t>
             </a:fld>
             <a:endParaRPr lang="en-US" dirty="0"/>
           </a:p>
@@ -7539,7 +7567,7 @@
             <a:fld id="{09B482E8-6E0E-1B4F-B1FD-C69DB9E858D9}" type="datetimeFigureOut">
               <a:rPr lang="en-US" smtClean="0"/>
               <a:pPr/>
-              <a:t>1/21/26</a:t>
+              <a:t>1/27/26</a:t>
             </a:fld>
             <a:endParaRPr lang="en-US" dirty="0"/>
           </a:p>
@@ -7956,7 +7984,7 @@
             <a:fld id="{09B482E8-6E0E-1B4F-B1FD-C69DB9E858D9}" type="datetimeFigureOut">
               <a:rPr lang="en-US" smtClean="0"/>
               <a:pPr/>
-              <a:t>1/21/26</a:t>
+              <a:t>1/27/26</a:t>
             </a:fld>
             <a:endParaRPr lang="en-US" dirty="0"/>
           </a:p>
@@ -8208,7 +8236,7 @@
             <a:fld id="{09B482E8-6E0E-1B4F-B1FD-C69DB9E858D9}" type="datetimeFigureOut">
               <a:rPr lang="en-US" smtClean="0"/>
               <a:pPr/>
-              <a:t>1/21/26</a:t>
+              <a:t>1/27/26</a:t>
             </a:fld>
             <a:endParaRPr lang="en-US" dirty="0"/>
           </a:p>
@@ -8680,14 +8708,14 @@
           <a:noFill/>
           <a:extLst>
             <a:ext uri="{909E8E84-426E-40dd-AFC4-6F175D3DCCD1}">
-              <a14:hiddenFill xmlns="" xmlns:a14="http://schemas.microsoft.com/office/drawing/2010/main">
+              <a14:hiddenFill xmlns:a14="http://schemas.microsoft.com/office/drawing/2010/main" xmlns="">
                 <a:solidFill>
                   <a:srgbClr val="FFFFFF"/>
                 </a:solidFill>
               </a14:hiddenFill>
             </a:ext>
             <a:ext uri="{91240B29-F687-4f45-9708-019B960494DF}">
-              <a14:hiddenLine xmlns="" xmlns:a14="http://schemas.microsoft.com/office/drawing/2010/main" w="9525">
+              <a14:hiddenLine xmlns:a14="http://schemas.microsoft.com/office/drawing/2010/main" xmlns="" w="9525">
                 <a:solidFill>
                   <a:srgbClr val="000000"/>
                 </a:solidFill>
@@ -8895,7 +8923,13 @@
               <a:rPr kumimoji="1" lang="en-US" sz="3200">
                 <a:cs typeface="+mn-cs"/>
               </a:rPr>
-              <a:t>Chapter 1 - Introduction</a:t>
+              <a:t>Topic </a:t>
+            </a:r>
+            <a:r>
+              <a:rPr kumimoji="1" lang="en-US" sz="3200" dirty="0">
+                <a:cs typeface="+mn-cs"/>
+              </a:rPr>
+              <a:t>1 - Introduction</a:t>
             </a:r>
           </a:p>
         </p:txBody>
@@ -8935,14 +8969,14 @@
           </a:ln>
           <a:extLst>
             <a:ext uri="{909E8E84-426E-40dd-AFC4-6F175D3DCCD1}">
-              <a14:hiddenFill xmlns="" xmlns:a14="http://schemas.microsoft.com/office/drawing/2010/main">
+              <a14:hiddenFill xmlns:a14="http://schemas.microsoft.com/office/drawing/2010/main" xmlns="">
                 <a:solidFill>
                   <a:srgbClr val="FFFFFF"/>
                 </a:solidFill>
               </a14:hiddenFill>
             </a:ext>
             <a:ext uri="{91240B29-F687-4f45-9708-019B960494DF}">
-              <a14:hiddenLine xmlns="" xmlns:a14="http://schemas.microsoft.com/office/drawing/2010/main" w="9525">
+              <a14:hiddenLine xmlns:a14="http://schemas.microsoft.com/office/drawing/2010/main" xmlns="" w="9525">
                 <a:solidFill>
                   <a:srgbClr val="000000"/>
                 </a:solidFill>
@@ -12763,14 +12797,14 @@
           <a:noFill/>
           <a:extLst>
             <a:ext uri="{909E8E84-426E-40dd-AFC4-6F175D3DCCD1}">
-              <a14:hiddenFill xmlns="" xmlns:a14="http://schemas.microsoft.com/office/drawing/2010/main">
+              <a14:hiddenFill xmlns:a14="http://schemas.microsoft.com/office/drawing/2010/main" xmlns="">
                 <a:solidFill>
                   <a:srgbClr val="FFFFFF"/>
                 </a:solidFill>
               </a14:hiddenFill>
             </a:ext>
             <a:ext uri="{91240B29-F687-4f45-9708-019B960494DF}">
-              <a14:hiddenLine xmlns="" xmlns:a14="http://schemas.microsoft.com/office/drawing/2010/main" w="9525">
+              <a14:hiddenLine xmlns:a14="http://schemas.microsoft.com/office/drawing/2010/main" xmlns="" w="9525">
                 <a:solidFill>
                   <a:srgbClr val="000000"/>
                 </a:solidFill>
@@ -12977,14 +13011,14 @@
           <a:noFill/>
           <a:extLst>
             <a:ext uri="{909E8E84-426E-40dd-AFC4-6F175D3DCCD1}">
-              <a14:hiddenFill xmlns="" xmlns:a14="http://schemas.microsoft.com/office/drawing/2010/main">
+              <a14:hiddenFill xmlns:a14="http://schemas.microsoft.com/office/drawing/2010/main" xmlns="">
                 <a:solidFill>
                   <a:srgbClr val="FFFFFF"/>
                 </a:solidFill>
               </a14:hiddenFill>
             </a:ext>
             <a:ext uri="{91240B29-F687-4f45-9708-019B960494DF}">
-              <a14:hiddenLine xmlns="" xmlns:a14="http://schemas.microsoft.com/office/drawing/2010/main" w="9525">
+              <a14:hiddenLine xmlns:a14="http://schemas.microsoft.com/office/drawing/2010/main" xmlns="" w="9525">
                 <a:solidFill>
                   <a:srgbClr val="000000"/>
                 </a:solidFill>
@@ -13394,14 +13428,14 @@
           <a:noFill/>
           <a:extLst>
             <a:ext uri="{909E8E84-426E-40dd-AFC4-6F175D3DCCD1}">
-              <a14:hiddenFill xmlns="" xmlns:a14="http://schemas.microsoft.com/office/drawing/2010/main">
+              <a14:hiddenFill xmlns:a14="http://schemas.microsoft.com/office/drawing/2010/main" xmlns="">
                 <a:solidFill>
                   <a:srgbClr val="FFFFFF"/>
                 </a:solidFill>
               </a14:hiddenFill>
             </a:ext>
             <a:ext uri="{91240B29-F687-4f45-9708-019B960494DF}">
-              <a14:hiddenLine xmlns="" xmlns:a14="http://schemas.microsoft.com/office/drawing/2010/main" w="9525">
+              <a14:hiddenLine xmlns:a14="http://schemas.microsoft.com/office/drawing/2010/main" xmlns="" w="9525">
                 <a:solidFill>
                   <a:srgbClr val="000000"/>
                 </a:solidFill>
@@ -14556,14 +14590,14 @@
           <a:noFill/>
           <a:extLst>
             <a:ext uri="{909E8E84-426E-40dd-AFC4-6F175D3DCCD1}">
-              <a14:hiddenFill xmlns="" xmlns:a14="http://schemas.microsoft.com/office/drawing/2010/main">
+              <a14:hiddenFill xmlns:a14="http://schemas.microsoft.com/office/drawing/2010/main" xmlns="">
                 <a:solidFill>
                   <a:srgbClr val="FFFFFF"/>
                 </a:solidFill>
               </a14:hiddenFill>
             </a:ext>
             <a:ext uri="{91240B29-F687-4f45-9708-019B960494DF}">
-              <a14:hiddenLine xmlns="" xmlns:a14="http://schemas.microsoft.com/office/drawing/2010/main" w="9525">
+              <a14:hiddenLine xmlns:a14="http://schemas.microsoft.com/office/drawing/2010/main" xmlns="" w="9525">
                 <a:solidFill>
                   <a:srgbClr val="000000"/>
                 </a:solidFill>
@@ -15549,14 +15583,14 @@
           <a:noFill/>
           <a:extLst>
             <a:ext uri="{909E8E84-426E-40dd-AFC4-6F175D3DCCD1}">
-              <a14:hiddenFill xmlns="" xmlns:a14="http://schemas.microsoft.com/office/drawing/2010/main">
+              <a14:hiddenFill xmlns:a14="http://schemas.microsoft.com/office/drawing/2010/main" xmlns="">
                 <a:solidFill>
                   <a:srgbClr val="FFFFFF"/>
                 </a:solidFill>
               </a14:hiddenFill>
             </a:ext>
             <a:ext uri="{91240B29-F687-4f45-9708-019B960494DF}">
-              <a14:hiddenLine xmlns="" xmlns:a14="http://schemas.microsoft.com/office/drawing/2010/main" w="9525">
+              <a14:hiddenLine xmlns:a14="http://schemas.microsoft.com/office/drawing/2010/main" xmlns="" w="9525">
                 <a:solidFill>
                   <a:srgbClr val="000000"/>
                 </a:solidFill>
@@ -17166,14 +17200,14 @@
           <a:noFill/>
           <a:extLst>
             <a:ext uri="{909E8E84-426E-40dd-AFC4-6F175D3DCCD1}">
-              <a14:hiddenFill xmlns="" xmlns:a14="http://schemas.microsoft.com/office/drawing/2010/main">
+              <a14:hiddenFill xmlns:a14="http://schemas.microsoft.com/office/drawing/2010/main" xmlns="">
                 <a:solidFill>
                   <a:srgbClr val="FFFFFF"/>
                 </a:solidFill>
               </a14:hiddenFill>
             </a:ext>
             <a:ext uri="{91240B29-F687-4f45-9708-019B960494DF}">
-              <a14:hiddenLine xmlns="" xmlns:a14="http://schemas.microsoft.com/office/drawing/2010/main" w="9525">
+              <a14:hiddenLine xmlns:a14="http://schemas.microsoft.com/office/drawing/2010/main" xmlns="" w="9525">
                 <a:solidFill>
                   <a:srgbClr val="000000"/>
                 </a:solidFill>
@@ -18253,14 +18287,14 @@
           <a:noFill/>
           <a:extLst>
             <a:ext uri="{909E8E84-426E-40dd-AFC4-6F175D3DCCD1}">
-              <a14:hiddenFill xmlns:a14="http://schemas.microsoft.com/office/drawing/2010/main" xmlns="">
+              <a14:hiddenFill xmlns="" xmlns:a14="http://schemas.microsoft.com/office/drawing/2010/main">
                 <a:solidFill>
                   <a:srgbClr val="FFFFFF"/>
                 </a:solidFill>
               </a14:hiddenFill>
             </a:ext>
             <a:ext uri="{91240B29-F687-4f45-9708-019B960494DF}">
-              <a14:hiddenLine xmlns:a14="http://schemas.microsoft.com/office/drawing/2010/main" xmlns="" w="9525">
+              <a14:hiddenLine xmlns="" xmlns:a14="http://schemas.microsoft.com/office/drawing/2010/main" w="9525">
                 <a:solidFill>
                   <a:srgbClr val="000000"/>
                 </a:solidFill>

</xml_diff>